<commit_message>
update to cnn pres
</commit_message>
<xml_diff>
--- a/Presentations/ML Convolutional Neural Networks.pptx
+++ b/Presentations/ML Convolutional Neural Networks.pptx
@@ -5,7 +5,7 @@
     <p:sldMasterId id="2147483648" r:id="rId1"/>
   </p:sldMasterIdLst>
   <p:notesMasterIdLst>
-    <p:notesMasterId r:id="rId18"/>
+    <p:notesMasterId r:id="rId19"/>
   </p:notesMasterIdLst>
   <p:sldIdLst>
     <p:sldId id="256" r:id="rId2"/>
@@ -23,7 +23,8 @@
     <p:sldId id="297" r:id="rId14"/>
     <p:sldId id="299" r:id="rId15"/>
     <p:sldId id="300" r:id="rId16"/>
-    <p:sldId id="301" r:id="rId17"/>
+    <p:sldId id="302" r:id="rId17"/>
+    <p:sldId id="301" r:id="rId18"/>
   </p:sldIdLst>
   <p:sldSz cx="9144000" cy="6858000" type="screen4x3"/>
   <p:notesSz cx="6858000" cy="9144000"/>
@@ -207,7 +208,7 @@
           <a:p>
             <a:fld id="{FAF957FC-5175-49AC-8D2B-2F056FFFC1DD}" type="datetimeFigureOut">
               <a:rPr lang="en-US" smtClean="0"/>
-              <a:t>8/21/2017</a:t>
+              <a:t>9/7/2017</a:t>
             </a:fld>
             <a:endParaRPr lang="en-US"/>
           </a:p>
@@ -801,6 +802,90 @@
     </p:spTree>
     <p:extLst>
       <p:ext uri="{BB962C8B-B14F-4D97-AF65-F5344CB8AC3E}">
+        <p14:creationId xmlns:p14="http://schemas.microsoft.com/office/powerpoint/2010/main" val="686686729"/>
+      </p:ext>
+    </p:extLst>
+  </p:cSld>
+  <p:clrMapOvr>
+    <a:masterClrMapping/>
+  </p:clrMapOvr>
+</p:notes>
+</file>
+
+<file path=ppt/notesSlides/notesSlide5.xml><?xml version="1.0" encoding="utf-8"?>
+<p:notes xmlns:a="http://schemas.openxmlformats.org/drawingml/2006/main" xmlns:r="http://schemas.openxmlformats.org/officeDocument/2006/relationships" xmlns:p="http://schemas.openxmlformats.org/presentationml/2006/main">
+  <p:cSld>
+    <p:spTree>
+      <p:nvGrpSpPr>
+        <p:cNvPr id="1" name=""/>
+        <p:cNvGrpSpPr/>
+        <p:nvPr/>
+      </p:nvGrpSpPr>
+      <p:grpSpPr>
+        <a:xfrm>
+          <a:off x="0" y="0"/>
+          <a:ext cx="0" cy="0"/>
+          <a:chOff x="0" y="0"/>
+          <a:chExt cx="0" cy="0"/>
+        </a:xfrm>
+      </p:grpSpPr>
+      <p:sp>
+        <p:nvSpPr>
+          <p:cNvPr id="2" name="Slide Image Placeholder 1"/>
+          <p:cNvSpPr>
+            <a:spLocks noGrp="1" noRot="1" noChangeAspect="1"/>
+          </p:cNvSpPr>
+          <p:nvPr>
+            <p:ph type="sldImg"/>
+          </p:nvPr>
+        </p:nvSpPr>
+        <p:spPr/>
+      </p:sp>
+      <p:sp>
+        <p:nvSpPr>
+          <p:cNvPr id="3" name="Notes Placeholder 2"/>
+          <p:cNvSpPr>
+            <a:spLocks noGrp="1"/>
+          </p:cNvSpPr>
+          <p:nvPr>
+            <p:ph type="body" idx="1"/>
+          </p:nvPr>
+        </p:nvSpPr>
+        <p:spPr/>
+        <p:txBody>
+          <a:bodyPr/>
+          <a:lstStyle/>
+          <a:p>
+            <a:endParaRPr lang="en-US" dirty="0"/>
+          </a:p>
+        </p:txBody>
+      </p:sp>
+      <p:sp>
+        <p:nvSpPr>
+          <p:cNvPr id="4" name="Slide Number Placeholder 3"/>
+          <p:cNvSpPr>
+            <a:spLocks noGrp="1"/>
+          </p:cNvSpPr>
+          <p:nvPr>
+            <p:ph type="sldNum" sz="quarter" idx="10"/>
+          </p:nvPr>
+        </p:nvSpPr>
+        <p:spPr/>
+        <p:txBody>
+          <a:bodyPr/>
+          <a:lstStyle/>
+          <a:p>
+            <a:fld id="{F06D5892-0430-4AF2-93AC-99DFD0427A02}" type="slidenum">
+              <a:rPr lang="en-US" smtClean="0"/>
+              <a:t>17</a:t>
+            </a:fld>
+            <a:endParaRPr lang="en-US"/>
+          </a:p>
+        </p:txBody>
+      </p:sp>
+    </p:spTree>
+    <p:extLst>
+      <p:ext uri="{BB962C8B-B14F-4D97-AF65-F5344CB8AC3E}">
         <p14:creationId xmlns:p14="http://schemas.microsoft.com/office/powerpoint/2010/main" val="4276701062"/>
       </p:ext>
     </p:extLst>
@@ -993,7 +1078,7 @@
             <a:fld id="{1D8BD707-D9CF-40AE-B4C6-C98DA3205C09}" type="datetimeFigureOut">
               <a:rPr lang="en-US" smtClean="0"/>
               <a:pPr/>
-              <a:t>8/21/2017</a:t>
+              <a:t>9/7/2017</a:t>
             </a:fld>
             <a:endParaRPr lang="en-US"/>
           </a:p>
@@ -1160,7 +1245,7 @@
             <a:fld id="{1D8BD707-D9CF-40AE-B4C6-C98DA3205C09}" type="datetimeFigureOut">
               <a:rPr lang="en-US" smtClean="0"/>
               <a:pPr/>
-              <a:t>8/21/2017</a:t>
+              <a:t>9/7/2017</a:t>
             </a:fld>
             <a:endParaRPr lang="en-US"/>
           </a:p>
@@ -1337,7 +1422,7 @@
             <a:fld id="{1D8BD707-D9CF-40AE-B4C6-C98DA3205C09}" type="datetimeFigureOut">
               <a:rPr lang="en-US" smtClean="0"/>
               <a:pPr/>
-              <a:t>8/21/2017</a:t>
+              <a:t>9/7/2017</a:t>
             </a:fld>
             <a:endParaRPr lang="en-US"/>
           </a:p>
@@ -1504,7 +1589,7 @@
             <a:fld id="{1D8BD707-D9CF-40AE-B4C6-C98DA3205C09}" type="datetimeFigureOut">
               <a:rPr lang="en-US" smtClean="0"/>
               <a:pPr/>
-              <a:t>8/21/2017</a:t>
+              <a:t>9/7/2017</a:t>
             </a:fld>
             <a:endParaRPr lang="en-US"/>
           </a:p>
@@ -1747,7 +1832,7 @@
             <a:fld id="{1D8BD707-D9CF-40AE-B4C6-C98DA3205C09}" type="datetimeFigureOut">
               <a:rPr lang="en-US" smtClean="0"/>
               <a:pPr/>
-              <a:t>8/21/2017</a:t>
+              <a:t>9/7/2017</a:t>
             </a:fld>
             <a:endParaRPr lang="en-US"/>
           </a:p>
@@ -2032,7 +2117,7 @@
             <a:fld id="{1D8BD707-D9CF-40AE-B4C6-C98DA3205C09}" type="datetimeFigureOut">
               <a:rPr lang="en-US" smtClean="0"/>
               <a:pPr/>
-              <a:t>8/21/2017</a:t>
+              <a:t>9/7/2017</a:t>
             </a:fld>
             <a:endParaRPr lang="en-US"/>
           </a:p>
@@ -2451,7 +2536,7 @@
             <a:fld id="{1D8BD707-D9CF-40AE-B4C6-C98DA3205C09}" type="datetimeFigureOut">
               <a:rPr lang="en-US" smtClean="0"/>
               <a:pPr/>
-              <a:t>8/21/2017</a:t>
+              <a:t>9/7/2017</a:t>
             </a:fld>
             <a:endParaRPr lang="en-US"/>
           </a:p>
@@ -2566,7 +2651,7 @@
             <a:fld id="{1D8BD707-D9CF-40AE-B4C6-C98DA3205C09}" type="datetimeFigureOut">
               <a:rPr lang="en-US" smtClean="0"/>
               <a:pPr/>
-              <a:t>8/21/2017</a:t>
+              <a:t>9/7/2017</a:t>
             </a:fld>
             <a:endParaRPr lang="en-US"/>
           </a:p>
@@ -2658,7 +2743,7 @@
             <a:fld id="{1D8BD707-D9CF-40AE-B4C6-C98DA3205C09}" type="datetimeFigureOut">
               <a:rPr lang="en-US" smtClean="0"/>
               <a:pPr/>
-              <a:t>8/21/2017</a:t>
+              <a:t>9/7/2017</a:t>
             </a:fld>
             <a:endParaRPr lang="en-US"/>
           </a:p>
@@ -2932,7 +3017,7 @@
             <a:fld id="{1D8BD707-D9CF-40AE-B4C6-C98DA3205C09}" type="datetimeFigureOut">
               <a:rPr lang="en-US" smtClean="0"/>
               <a:pPr/>
-              <a:t>8/21/2017</a:t>
+              <a:t>9/7/2017</a:t>
             </a:fld>
             <a:endParaRPr lang="en-US"/>
           </a:p>
@@ -3182,7 +3267,7 @@
             <a:fld id="{1D8BD707-D9CF-40AE-B4C6-C98DA3205C09}" type="datetimeFigureOut">
               <a:rPr lang="en-US" smtClean="0"/>
               <a:pPr/>
-              <a:t>8/21/2017</a:t>
+              <a:t>9/7/2017</a:t>
             </a:fld>
             <a:endParaRPr lang="en-US"/>
           </a:p>
@@ -3392,7 +3477,7 @@
             <a:fld id="{1D8BD707-D9CF-40AE-B4C6-C98DA3205C09}" type="datetimeFigureOut">
               <a:rPr lang="en-US" smtClean="0"/>
               <a:pPr/>
-              <a:t>8/21/2017</a:t>
+              <a:t>9/7/2017</a:t>
             </a:fld>
             <a:endParaRPr lang="en-US"/>
           </a:p>
@@ -22938,6 +23023,1045 @@
                   </a:schemeClr>
                 </a:solidFill>
               </a:rPr>
+              <a:t>Pooling Options</a:t>
+            </a:r>
+            <a:endParaRPr lang="en-US" dirty="0">
+              <a:solidFill>
+                <a:schemeClr val="accent1">
+                  <a:lumMod val="75000"/>
+                </a:schemeClr>
+              </a:solidFill>
+            </a:endParaRPr>
+          </a:p>
+        </p:txBody>
+      </p:sp>
+      <p:cxnSp>
+        <p:nvCxnSpPr>
+          <p:cNvPr id="5" name="Straight Connector 4"/>
+          <p:cNvCxnSpPr/>
+          <p:nvPr/>
+        </p:nvCxnSpPr>
+        <p:spPr>
+          <a:xfrm>
+            <a:off x="0" y="990600"/>
+            <a:ext cx="9144000" cy="0"/>
+          </a:xfrm>
+          <a:prstGeom prst="line">
+            <a:avLst/>
+          </a:prstGeom>
+          <a:ln w="19050"/>
+        </p:spPr>
+        <p:style>
+          <a:lnRef idx="1">
+            <a:schemeClr val="accent1"/>
+          </a:lnRef>
+          <a:fillRef idx="0">
+            <a:schemeClr val="accent1"/>
+          </a:fillRef>
+          <a:effectRef idx="0">
+            <a:schemeClr val="accent1"/>
+          </a:effectRef>
+          <a:fontRef idx="minor">
+            <a:schemeClr val="tx1"/>
+          </a:fontRef>
+        </p:style>
+      </p:cxnSp>
+      <p:sp>
+        <p:nvSpPr>
+          <p:cNvPr id="184" name="TextBox 183"/>
+          <p:cNvSpPr txBox="1"/>
+          <p:nvPr/>
+        </p:nvSpPr>
+        <p:spPr>
+          <a:xfrm>
+            <a:off x="152400" y="1164134"/>
+            <a:ext cx="8842614" cy="3539430"/>
+          </a:xfrm>
+          <a:prstGeom prst="rect">
+            <a:avLst/>
+          </a:prstGeom>
+          <a:noFill/>
+        </p:spPr>
+        <p:txBody>
+          <a:bodyPr wrap="none" rtlCol="0">
+            <a:spAutoFit/>
+          </a:bodyPr>
+          <a:lstStyle/>
+          <a:p>
+            <a:pPr marL="285750" indent="-285750">
+              <a:buFont typeface="Arial" panose="020B0604020202020204" pitchFamily="34" charset="0"/>
+              <a:buChar char="•"/>
+            </a:pPr>
+            <a:r>
+              <a:rPr lang="en-US" sz="2800" b="1" dirty="0" smtClean="0">
+                <a:solidFill>
+                  <a:schemeClr val="accent5">
+                    <a:lumMod val="75000"/>
+                  </a:schemeClr>
+                </a:solidFill>
+              </a:rPr>
+              <a:t>Max Pooling</a:t>
+            </a:r>
+            <a:endParaRPr lang="en-US" sz="2800" b="1" dirty="0" smtClean="0">
+              <a:solidFill>
+                <a:schemeClr val="accent5">
+                  <a:lumMod val="75000"/>
+                </a:schemeClr>
+              </a:solidFill>
+            </a:endParaRPr>
+          </a:p>
+          <a:p>
+            <a:pPr marL="742950" lvl="1" indent="-285750">
+              <a:buFont typeface="Arial" panose="020B0604020202020204" pitchFamily="34" charset="0"/>
+              <a:buChar char="•"/>
+            </a:pPr>
+            <a:r>
+              <a:rPr lang="en-US" sz="2400" b="1" dirty="0" smtClean="0">
+                <a:solidFill>
+                  <a:schemeClr val="accent6">
+                    <a:lumMod val="75000"/>
+                  </a:schemeClr>
+                </a:solidFill>
+              </a:rPr>
+              <a:t>Finds the pixel with the highest value within the </a:t>
+            </a:r>
+            <a:r>
+              <a:rPr lang="en-US" sz="2400" b="1" dirty="0" smtClean="0">
+                <a:solidFill>
+                  <a:schemeClr val="accent6">
+                    <a:lumMod val="75000"/>
+                  </a:schemeClr>
+                </a:solidFill>
+              </a:rPr>
+              <a:t>window</a:t>
+            </a:r>
+            <a:r>
+              <a:rPr lang="en-US" sz="2400" b="1" dirty="0">
+                <a:solidFill>
+                  <a:schemeClr val="accent6">
+                    <a:lumMod val="75000"/>
+                  </a:schemeClr>
+                </a:solidFill>
+              </a:rPr>
+              <a:t> </a:t>
+            </a:r>
+            <a:r>
+              <a:rPr lang="en-US" sz="2400" b="1" dirty="0" smtClean="0">
+                <a:solidFill>
+                  <a:schemeClr val="accent6">
+                    <a:lumMod val="75000"/>
+                  </a:schemeClr>
+                </a:solidFill>
+              </a:rPr>
+              <a:t>(also</a:t>
+            </a:r>
+          </a:p>
+          <a:p>
+            <a:pPr lvl="1"/>
+            <a:r>
+              <a:rPr lang="en-US" sz="2400" b="1" dirty="0">
+                <a:solidFill>
+                  <a:schemeClr val="accent6">
+                    <a:lumMod val="75000"/>
+                  </a:schemeClr>
+                </a:solidFill>
+              </a:rPr>
+              <a:t> </a:t>
+            </a:r>
+            <a:r>
+              <a:rPr lang="en-US" sz="2400" b="1" dirty="0" smtClean="0">
+                <a:solidFill>
+                  <a:schemeClr val="accent6">
+                    <a:lumMod val="75000"/>
+                  </a:schemeClr>
+                </a:solidFill>
+              </a:rPr>
+              <a:t>   known as </a:t>
+            </a:r>
+            <a:r>
+              <a:rPr lang="en-US" sz="2400" b="1" dirty="0" err="1" smtClean="0">
+                <a:solidFill>
+                  <a:schemeClr val="accent6">
+                    <a:lumMod val="75000"/>
+                  </a:schemeClr>
+                </a:solidFill>
+              </a:rPr>
+              <a:t>downsampling</a:t>
+            </a:r>
+            <a:r>
+              <a:rPr lang="en-US" sz="2400" b="1" dirty="0" smtClean="0">
+                <a:solidFill>
+                  <a:schemeClr val="accent6">
+                    <a:lumMod val="75000"/>
+                  </a:schemeClr>
+                </a:solidFill>
+              </a:rPr>
+              <a:t>).</a:t>
+            </a:r>
+          </a:p>
+          <a:p>
+            <a:pPr marL="742950" lvl="1" indent="-285750">
+              <a:buFont typeface="Arial" panose="020B0604020202020204" pitchFamily="34" charset="0"/>
+              <a:buChar char="•"/>
+            </a:pPr>
+            <a:endParaRPr lang="en-US" sz="2400" b="1" dirty="0">
+              <a:solidFill>
+                <a:schemeClr val="accent6">
+                  <a:lumMod val="75000"/>
+                </a:schemeClr>
+              </a:solidFill>
+            </a:endParaRPr>
+          </a:p>
+          <a:p>
+            <a:pPr lvl="1"/>
+            <a:r>
+              <a:rPr lang="en-US" sz="2400" b="1" dirty="0" smtClean="0">
+                <a:solidFill>
+                  <a:schemeClr val="accent6">
+                    <a:lumMod val="75000"/>
+                  </a:schemeClr>
+                </a:solidFill>
+              </a:rPr>
+              <a:t>					</a:t>
+            </a:r>
+            <a:r>
+              <a:rPr lang="en-US" sz="2400" b="1" dirty="0" smtClean="0"/>
+              <a:t>4</a:t>
+            </a:r>
+          </a:p>
+          <a:p>
+            <a:pPr lvl="1"/>
+            <a:r>
+              <a:rPr lang="en-US" sz="2400" b="1" dirty="0" smtClean="0">
+                <a:solidFill>
+                  <a:schemeClr val="accent5">
+                    <a:lumMod val="75000"/>
+                  </a:schemeClr>
+                </a:solidFill>
+              </a:rPr>
+              <a:t> </a:t>
+            </a:r>
+          </a:p>
+          <a:p>
+            <a:pPr marL="285750" indent="-285750">
+              <a:buFont typeface="Arial" panose="020B0604020202020204" pitchFamily="34" charset="0"/>
+              <a:buChar char="•"/>
+            </a:pPr>
+            <a:r>
+              <a:rPr lang="en-US" sz="2800" b="1" dirty="0" smtClean="0">
+                <a:solidFill>
+                  <a:schemeClr val="accent5">
+                    <a:lumMod val="75000"/>
+                  </a:schemeClr>
+                </a:solidFill>
+              </a:rPr>
+              <a:t>Mean Pooling</a:t>
+            </a:r>
+            <a:endParaRPr lang="en-US" sz="2800" b="1" dirty="0">
+              <a:solidFill>
+                <a:schemeClr val="accent5">
+                  <a:lumMod val="75000"/>
+                </a:schemeClr>
+              </a:solidFill>
+            </a:endParaRPr>
+          </a:p>
+          <a:p>
+            <a:pPr marL="742950" lvl="1" indent="-285750">
+              <a:buFont typeface="Arial" panose="020B0604020202020204" pitchFamily="34" charset="0"/>
+              <a:buChar char="•"/>
+            </a:pPr>
+            <a:r>
+              <a:rPr lang="en-US" sz="2400" b="1" dirty="0" smtClean="0">
+                <a:solidFill>
+                  <a:schemeClr val="accent6">
+                    <a:lumMod val="75000"/>
+                  </a:schemeClr>
+                </a:solidFill>
+              </a:rPr>
+              <a:t>Calculates the average value of all pixels within the window</a:t>
+            </a:r>
+          </a:p>
+          <a:p>
+            <a:pPr lvl="1"/>
+            <a:r>
+              <a:rPr lang="en-US" sz="2400" b="1" dirty="0">
+                <a:solidFill>
+                  <a:schemeClr val="accent6">
+                    <a:lumMod val="75000"/>
+                  </a:schemeClr>
+                </a:solidFill>
+              </a:rPr>
+              <a:t> </a:t>
+            </a:r>
+            <a:r>
+              <a:rPr lang="en-US" sz="2400" b="1" dirty="0" smtClean="0">
+                <a:solidFill>
+                  <a:schemeClr val="accent6">
+                    <a:lumMod val="75000"/>
+                  </a:schemeClr>
+                </a:solidFill>
+              </a:rPr>
+              <a:t>    (also known as subsampling).</a:t>
+            </a:r>
+          </a:p>
+        </p:txBody>
+      </p:sp>
+      <p:sp>
+        <p:nvSpPr>
+          <p:cNvPr id="92" name="Rectangle 91"/>
+          <p:cNvSpPr/>
+          <p:nvPr/>
+        </p:nvSpPr>
+        <p:spPr>
+          <a:xfrm>
+            <a:off x="3630657" y="2552849"/>
+            <a:ext cx="381000" cy="381000"/>
+          </a:xfrm>
+          <a:prstGeom prst="rect">
+            <a:avLst/>
+          </a:prstGeom>
+          <a:noFill/>
+          <a:ln w="19050">
+            <a:solidFill>
+              <a:schemeClr val="tx1"/>
+            </a:solidFill>
+          </a:ln>
+        </p:spPr>
+        <p:style>
+          <a:lnRef idx="2">
+            <a:schemeClr val="accent1">
+              <a:shade val="50000"/>
+            </a:schemeClr>
+          </a:lnRef>
+          <a:fillRef idx="1">
+            <a:schemeClr val="accent1"/>
+          </a:fillRef>
+          <a:effectRef idx="0">
+            <a:schemeClr val="accent1"/>
+          </a:effectRef>
+          <a:fontRef idx="minor">
+            <a:schemeClr val="lt1"/>
+          </a:fontRef>
+        </p:style>
+        <p:txBody>
+          <a:bodyPr rtlCol="0" anchor="ctr"/>
+          <a:lstStyle/>
+          <a:p>
+            <a:pPr algn="ctr"/>
+            <a:r>
+              <a:rPr lang="en-US" dirty="0" smtClean="0">
+                <a:solidFill>
+                  <a:schemeClr val="tx1"/>
+                </a:solidFill>
+              </a:rPr>
+              <a:t>2</a:t>
+            </a:r>
+            <a:endParaRPr lang="en-US" dirty="0">
+              <a:solidFill>
+                <a:schemeClr val="tx1"/>
+              </a:solidFill>
+            </a:endParaRPr>
+          </a:p>
+        </p:txBody>
+      </p:sp>
+      <p:sp>
+        <p:nvSpPr>
+          <p:cNvPr id="93" name="Rectangle 92"/>
+          <p:cNvSpPr/>
+          <p:nvPr/>
+        </p:nvSpPr>
+        <p:spPr>
+          <a:xfrm>
+            <a:off x="4011657" y="2552849"/>
+            <a:ext cx="381000" cy="381000"/>
+          </a:xfrm>
+          <a:prstGeom prst="rect">
+            <a:avLst/>
+          </a:prstGeom>
+          <a:noFill/>
+          <a:ln w="19050">
+            <a:solidFill>
+              <a:schemeClr val="tx1"/>
+            </a:solidFill>
+          </a:ln>
+        </p:spPr>
+        <p:style>
+          <a:lnRef idx="2">
+            <a:schemeClr val="accent1">
+              <a:shade val="50000"/>
+            </a:schemeClr>
+          </a:lnRef>
+          <a:fillRef idx="1">
+            <a:schemeClr val="accent1"/>
+          </a:fillRef>
+          <a:effectRef idx="0">
+            <a:schemeClr val="accent1"/>
+          </a:effectRef>
+          <a:fontRef idx="minor">
+            <a:schemeClr val="lt1"/>
+          </a:fontRef>
+        </p:style>
+        <p:txBody>
+          <a:bodyPr rtlCol="0" anchor="ctr"/>
+          <a:lstStyle/>
+          <a:p>
+            <a:pPr algn="ctr"/>
+            <a:r>
+              <a:rPr lang="en-US" dirty="0" smtClean="0">
+                <a:solidFill>
+                  <a:schemeClr val="tx1"/>
+                </a:solidFill>
+              </a:rPr>
+              <a:t>0</a:t>
+            </a:r>
+            <a:endParaRPr lang="en-US" dirty="0">
+              <a:solidFill>
+                <a:schemeClr val="tx1"/>
+              </a:solidFill>
+            </a:endParaRPr>
+          </a:p>
+        </p:txBody>
+      </p:sp>
+      <p:sp>
+        <p:nvSpPr>
+          <p:cNvPr id="94" name="Rectangle 93"/>
+          <p:cNvSpPr/>
+          <p:nvPr/>
+        </p:nvSpPr>
+        <p:spPr>
+          <a:xfrm>
+            <a:off x="3630657" y="2933849"/>
+            <a:ext cx="381000" cy="381000"/>
+          </a:xfrm>
+          <a:prstGeom prst="rect">
+            <a:avLst/>
+          </a:prstGeom>
+          <a:noFill/>
+          <a:ln w="19050">
+            <a:solidFill>
+              <a:schemeClr val="tx1"/>
+            </a:solidFill>
+          </a:ln>
+        </p:spPr>
+        <p:style>
+          <a:lnRef idx="2">
+            <a:schemeClr val="accent1">
+              <a:shade val="50000"/>
+            </a:schemeClr>
+          </a:lnRef>
+          <a:fillRef idx="1">
+            <a:schemeClr val="accent1"/>
+          </a:fillRef>
+          <a:effectRef idx="0">
+            <a:schemeClr val="accent1"/>
+          </a:effectRef>
+          <a:fontRef idx="minor">
+            <a:schemeClr val="lt1"/>
+          </a:fontRef>
+        </p:style>
+        <p:txBody>
+          <a:bodyPr rtlCol="0" anchor="ctr"/>
+          <a:lstStyle/>
+          <a:p>
+            <a:pPr algn="ctr"/>
+            <a:r>
+              <a:rPr lang="en-US" dirty="0" smtClean="0">
+                <a:solidFill>
+                  <a:schemeClr val="tx1"/>
+                </a:solidFill>
+              </a:rPr>
+              <a:t>0</a:t>
+            </a:r>
+            <a:endParaRPr lang="en-US" dirty="0">
+              <a:solidFill>
+                <a:schemeClr val="tx1"/>
+              </a:solidFill>
+            </a:endParaRPr>
+          </a:p>
+        </p:txBody>
+      </p:sp>
+      <p:sp>
+        <p:nvSpPr>
+          <p:cNvPr id="95" name="Rectangle 94"/>
+          <p:cNvSpPr/>
+          <p:nvPr/>
+        </p:nvSpPr>
+        <p:spPr>
+          <a:xfrm>
+            <a:off x="4011657" y="2933849"/>
+            <a:ext cx="381000" cy="381000"/>
+          </a:xfrm>
+          <a:prstGeom prst="rect">
+            <a:avLst/>
+          </a:prstGeom>
+          <a:noFill/>
+          <a:ln w="19050">
+            <a:solidFill>
+              <a:schemeClr val="tx1"/>
+            </a:solidFill>
+          </a:ln>
+        </p:spPr>
+        <p:style>
+          <a:lnRef idx="2">
+            <a:schemeClr val="accent1">
+              <a:shade val="50000"/>
+            </a:schemeClr>
+          </a:lnRef>
+          <a:fillRef idx="1">
+            <a:schemeClr val="accent1"/>
+          </a:fillRef>
+          <a:effectRef idx="0">
+            <a:schemeClr val="accent1"/>
+          </a:effectRef>
+          <a:fontRef idx="minor">
+            <a:schemeClr val="lt1"/>
+          </a:fontRef>
+        </p:style>
+        <p:txBody>
+          <a:bodyPr rtlCol="0" anchor="ctr"/>
+          <a:lstStyle/>
+          <a:p>
+            <a:pPr algn="ctr"/>
+            <a:r>
+              <a:rPr lang="en-US" dirty="0" smtClean="0">
+                <a:solidFill>
+                  <a:schemeClr val="tx1"/>
+                </a:solidFill>
+              </a:rPr>
+              <a:t>4</a:t>
+            </a:r>
+            <a:endParaRPr lang="en-US" dirty="0">
+              <a:solidFill>
+                <a:schemeClr val="tx1"/>
+              </a:solidFill>
+            </a:endParaRPr>
+          </a:p>
+        </p:txBody>
+      </p:sp>
+      <p:sp>
+        <p:nvSpPr>
+          <p:cNvPr id="96" name="Rectangle 95"/>
+          <p:cNvSpPr/>
+          <p:nvPr/>
+        </p:nvSpPr>
+        <p:spPr>
+          <a:xfrm>
+            <a:off x="3630657" y="2552849"/>
+            <a:ext cx="762000" cy="762000"/>
+          </a:xfrm>
+          <a:prstGeom prst="rect">
+            <a:avLst/>
+          </a:prstGeom>
+          <a:solidFill>
+            <a:schemeClr val="accent1">
+              <a:alpha val="24000"/>
+            </a:schemeClr>
+          </a:solidFill>
+        </p:spPr>
+        <p:style>
+          <a:lnRef idx="2">
+            <a:schemeClr val="accent1">
+              <a:shade val="50000"/>
+            </a:schemeClr>
+          </a:lnRef>
+          <a:fillRef idx="1">
+            <a:schemeClr val="accent1"/>
+          </a:fillRef>
+          <a:effectRef idx="0">
+            <a:schemeClr val="accent1"/>
+          </a:effectRef>
+          <a:fontRef idx="minor">
+            <a:schemeClr val="lt1"/>
+          </a:fontRef>
+        </p:style>
+        <p:txBody>
+          <a:bodyPr rtlCol="0" anchor="ctr"/>
+          <a:lstStyle/>
+          <a:p>
+            <a:pPr algn="ctr"/>
+            <a:endParaRPr lang="en-US"/>
+          </a:p>
+        </p:txBody>
+      </p:sp>
+      <p:sp>
+        <p:nvSpPr>
+          <p:cNvPr id="3" name="Right Arrow 2"/>
+          <p:cNvSpPr/>
+          <p:nvPr/>
+        </p:nvSpPr>
+        <p:spPr>
+          <a:xfrm>
+            <a:off x="4543425" y="2673057"/>
+            <a:ext cx="152400" cy="521583"/>
+          </a:xfrm>
+          <a:prstGeom prst="rightArrow">
+            <a:avLst/>
+          </a:prstGeom>
+          <a:solidFill>
+            <a:schemeClr val="bg1">
+              <a:lumMod val="50000"/>
+            </a:schemeClr>
+          </a:solidFill>
+          <a:ln>
+            <a:solidFill>
+              <a:schemeClr val="bg1">
+                <a:lumMod val="50000"/>
+              </a:schemeClr>
+            </a:solidFill>
+          </a:ln>
+        </p:spPr>
+        <p:style>
+          <a:lnRef idx="2">
+            <a:schemeClr val="accent1">
+              <a:shade val="50000"/>
+            </a:schemeClr>
+          </a:lnRef>
+          <a:fillRef idx="1">
+            <a:schemeClr val="accent1"/>
+          </a:fillRef>
+          <a:effectRef idx="0">
+            <a:schemeClr val="accent1"/>
+          </a:effectRef>
+          <a:fontRef idx="minor">
+            <a:schemeClr val="lt1"/>
+          </a:fontRef>
+        </p:style>
+        <p:txBody>
+          <a:bodyPr rtlCol="0" anchor="ctr"/>
+          <a:lstStyle/>
+          <a:p>
+            <a:pPr algn="ctr"/>
+            <a:endParaRPr lang="en-US"/>
+          </a:p>
+        </p:txBody>
+      </p:sp>
+      <p:sp>
+        <p:nvSpPr>
+          <p:cNvPr id="97" name="Rectangle 96"/>
+          <p:cNvSpPr/>
+          <p:nvPr/>
+        </p:nvSpPr>
+        <p:spPr>
+          <a:xfrm>
+            <a:off x="3575139" y="4941332"/>
+            <a:ext cx="381000" cy="381000"/>
+          </a:xfrm>
+          <a:prstGeom prst="rect">
+            <a:avLst/>
+          </a:prstGeom>
+          <a:noFill/>
+          <a:ln w="19050">
+            <a:solidFill>
+              <a:schemeClr val="tx1"/>
+            </a:solidFill>
+          </a:ln>
+        </p:spPr>
+        <p:style>
+          <a:lnRef idx="2">
+            <a:schemeClr val="accent1">
+              <a:shade val="50000"/>
+            </a:schemeClr>
+          </a:lnRef>
+          <a:fillRef idx="1">
+            <a:schemeClr val="accent1"/>
+          </a:fillRef>
+          <a:effectRef idx="0">
+            <a:schemeClr val="accent1"/>
+          </a:effectRef>
+          <a:fontRef idx="minor">
+            <a:schemeClr val="lt1"/>
+          </a:fontRef>
+        </p:style>
+        <p:txBody>
+          <a:bodyPr rtlCol="0" anchor="ctr"/>
+          <a:lstStyle/>
+          <a:p>
+            <a:pPr algn="ctr"/>
+            <a:r>
+              <a:rPr lang="en-US" dirty="0" smtClean="0">
+                <a:solidFill>
+                  <a:schemeClr val="tx1"/>
+                </a:solidFill>
+              </a:rPr>
+              <a:t>2</a:t>
+            </a:r>
+            <a:endParaRPr lang="en-US" dirty="0">
+              <a:solidFill>
+                <a:schemeClr val="tx1"/>
+              </a:solidFill>
+            </a:endParaRPr>
+          </a:p>
+        </p:txBody>
+      </p:sp>
+      <p:sp>
+        <p:nvSpPr>
+          <p:cNvPr id="98" name="Rectangle 97"/>
+          <p:cNvSpPr/>
+          <p:nvPr/>
+        </p:nvSpPr>
+        <p:spPr>
+          <a:xfrm>
+            <a:off x="3956139" y="4941332"/>
+            <a:ext cx="381000" cy="381000"/>
+          </a:xfrm>
+          <a:prstGeom prst="rect">
+            <a:avLst/>
+          </a:prstGeom>
+          <a:noFill/>
+          <a:ln w="19050">
+            <a:solidFill>
+              <a:schemeClr val="tx1"/>
+            </a:solidFill>
+          </a:ln>
+        </p:spPr>
+        <p:style>
+          <a:lnRef idx="2">
+            <a:schemeClr val="accent1">
+              <a:shade val="50000"/>
+            </a:schemeClr>
+          </a:lnRef>
+          <a:fillRef idx="1">
+            <a:schemeClr val="accent1"/>
+          </a:fillRef>
+          <a:effectRef idx="0">
+            <a:schemeClr val="accent1"/>
+          </a:effectRef>
+          <a:fontRef idx="minor">
+            <a:schemeClr val="lt1"/>
+          </a:fontRef>
+        </p:style>
+        <p:txBody>
+          <a:bodyPr rtlCol="0" anchor="ctr"/>
+          <a:lstStyle/>
+          <a:p>
+            <a:pPr algn="ctr"/>
+            <a:r>
+              <a:rPr lang="en-US" dirty="0" smtClean="0">
+                <a:solidFill>
+                  <a:schemeClr val="tx1"/>
+                </a:solidFill>
+              </a:rPr>
+              <a:t>0</a:t>
+            </a:r>
+            <a:endParaRPr lang="en-US" dirty="0">
+              <a:solidFill>
+                <a:schemeClr val="tx1"/>
+              </a:solidFill>
+            </a:endParaRPr>
+          </a:p>
+        </p:txBody>
+      </p:sp>
+      <p:sp>
+        <p:nvSpPr>
+          <p:cNvPr id="99" name="Rectangle 98"/>
+          <p:cNvSpPr/>
+          <p:nvPr/>
+        </p:nvSpPr>
+        <p:spPr>
+          <a:xfrm>
+            <a:off x="3575139" y="5322332"/>
+            <a:ext cx="381000" cy="381000"/>
+          </a:xfrm>
+          <a:prstGeom prst="rect">
+            <a:avLst/>
+          </a:prstGeom>
+          <a:noFill/>
+          <a:ln w="19050">
+            <a:solidFill>
+              <a:schemeClr val="tx1"/>
+            </a:solidFill>
+          </a:ln>
+        </p:spPr>
+        <p:style>
+          <a:lnRef idx="2">
+            <a:schemeClr val="accent1">
+              <a:shade val="50000"/>
+            </a:schemeClr>
+          </a:lnRef>
+          <a:fillRef idx="1">
+            <a:schemeClr val="accent1"/>
+          </a:fillRef>
+          <a:effectRef idx="0">
+            <a:schemeClr val="accent1"/>
+          </a:effectRef>
+          <a:fontRef idx="minor">
+            <a:schemeClr val="lt1"/>
+          </a:fontRef>
+        </p:style>
+        <p:txBody>
+          <a:bodyPr rtlCol="0" anchor="ctr"/>
+          <a:lstStyle/>
+          <a:p>
+            <a:pPr algn="ctr"/>
+            <a:r>
+              <a:rPr lang="en-US" dirty="0" smtClean="0">
+                <a:solidFill>
+                  <a:schemeClr val="tx1"/>
+                </a:solidFill>
+              </a:rPr>
+              <a:t>0</a:t>
+            </a:r>
+            <a:endParaRPr lang="en-US" dirty="0">
+              <a:solidFill>
+                <a:schemeClr val="tx1"/>
+              </a:solidFill>
+            </a:endParaRPr>
+          </a:p>
+        </p:txBody>
+      </p:sp>
+      <p:sp>
+        <p:nvSpPr>
+          <p:cNvPr id="100" name="Rectangle 99"/>
+          <p:cNvSpPr/>
+          <p:nvPr/>
+        </p:nvSpPr>
+        <p:spPr>
+          <a:xfrm>
+            <a:off x="3956139" y="5322332"/>
+            <a:ext cx="381000" cy="381000"/>
+          </a:xfrm>
+          <a:prstGeom prst="rect">
+            <a:avLst/>
+          </a:prstGeom>
+          <a:noFill/>
+          <a:ln w="19050">
+            <a:solidFill>
+              <a:schemeClr val="tx1"/>
+            </a:solidFill>
+          </a:ln>
+        </p:spPr>
+        <p:style>
+          <a:lnRef idx="2">
+            <a:schemeClr val="accent1">
+              <a:shade val="50000"/>
+            </a:schemeClr>
+          </a:lnRef>
+          <a:fillRef idx="1">
+            <a:schemeClr val="accent1"/>
+          </a:fillRef>
+          <a:effectRef idx="0">
+            <a:schemeClr val="accent1"/>
+          </a:effectRef>
+          <a:fontRef idx="minor">
+            <a:schemeClr val="lt1"/>
+          </a:fontRef>
+        </p:style>
+        <p:txBody>
+          <a:bodyPr rtlCol="0" anchor="ctr"/>
+          <a:lstStyle/>
+          <a:p>
+            <a:pPr algn="ctr"/>
+            <a:r>
+              <a:rPr lang="en-US" dirty="0" smtClean="0">
+                <a:solidFill>
+                  <a:schemeClr val="tx1"/>
+                </a:solidFill>
+              </a:rPr>
+              <a:t>4</a:t>
+            </a:r>
+            <a:endParaRPr lang="en-US" dirty="0">
+              <a:solidFill>
+                <a:schemeClr val="tx1"/>
+              </a:solidFill>
+            </a:endParaRPr>
+          </a:p>
+        </p:txBody>
+      </p:sp>
+      <p:sp>
+        <p:nvSpPr>
+          <p:cNvPr id="101" name="Rectangle 100"/>
+          <p:cNvSpPr/>
+          <p:nvPr/>
+        </p:nvSpPr>
+        <p:spPr>
+          <a:xfrm>
+            <a:off x="3575139" y="4941332"/>
+            <a:ext cx="762000" cy="762000"/>
+          </a:xfrm>
+          <a:prstGeom prst="rect">
+            <a:avLst/>
+          </a:prstGeom>
+          <a:solidFill>
+            <a:schemeClr val="accent1">
+              <a:alpha val="24000"/>
+            </a:schemeClr>
+          </a:solidFill>
+        </p:spPr>
+        <p:style>
+          <a:lnRef idx="2">
+            <a:schemeClr val="accent1">
+              <a:shade val="50000"/>
+            </a:schemeClr>
+          </a:lnRef>
+          <a:fillRef idx="1">
+            <a:schemeClr val="accent1"/>
+          </a:fillRef>
+          <a:effectRef idx="0">
+            <a:schemeClr val="accent1"/>
+          </a:effectRef>
+          <a:fontRef idx="minor">
+            <a:schemeClr val="lt1"/>
+          </a:fontRef>
+        </p:style>
+        <p:txBody>
+          <a:bodyPr rtlCol="0" anchor="ctr"/>
+          <a:lstStyle/>
+          <a:p>
+            <a:pPr algn="ctr"/>
+            <a:endParaRPr lang="en-US"/>
+          </a:p>
+        </p:txBody>
+      </p:sp>
+      <p:sp>
+        <p:nvSpPr>
+          <p:cNvPr id="102" name="Right Arrow 101"/>
+          <p:cNvSpPr/>
+          <p:nvPr/>
+        </p:nvSpPr>
+        <p:spPr>
+          <a:xfrm>
+            <a:off x="4487907" y="5061540"/>
+            <a:ext cx="152400" cy="521583"/>
+          </a:xfrm>
+          <a:prstGeom prst="rightArrow">
+            <a:avLst/>
+          </a:prstGeom>
+          <a:solidFill>
+            <a:schemeClr val="bg1">
+              <a:lumMod val="50000"/>
+            </a:schemeClr>
+          </a:solidFill>
+          <a:ln>
+            <a:solidFill>
+              <a:schemeClr val="bg1">
+                <a:lumMod val="50000"/>
+              </a:schemeClr>
+            </a:solidFill>
+          </a:ln>
+        </p:spPr>
+        <p:style>
+          <a:lnRef idx="2">
+            <a:schemeClr val="accent1">
+              <a:shade val="50000"/>
+            </a:schemeClr>
+          </a:lnRef>
+          <a:fillRef idx="1">
+            <a:schemeClr val="accent1"/>
+          </a:fillRef>
+          <a:effectRef idx="0">
+            <a:schemeClr val="accent1"/>
+          </a:effectRef>
+          <a:fontRef idx="minor">
+            <a:schemeClr val="lt1"/>
+          </a:fontRef>
+        </p:style>
+        <p:txBody>
+          <a:bodyPr rtlCol="0" anchor="ctr"/>
+          <a:lstStyle/>
+          <a:p>
+            <a:pPr algn="ctr"/>
+            <a:endParaRPr lang="en-US"/>
+          </a:p>
+        </p:txBody>
+      </p:sp>
+      <p:sp>
+        <p:nvSpPr>
+          <p:cNvPr id="4" name="TextBox 3"/>
+          <p:cNvSpPr txBox="1"/>
+          <p:nvPr/>
+        </p:nvSpPr>
+        <p:spPr>
+          <a:xfrm>
+            <a:off x="4772025" y="5091498"/>
+            <a:ext cx="340158" cy="461665"/>
+          </a:xfrm>
+          <a:prstGeom prst="rect">
+            <a:avLst/>
+          </a:prstGeom>
+          <a:noFill/>
+        </p:spPr>
+        <p:txBody>
+          <a:bodyPr wrap="none" rtlCol="0">
+            <a:spAutoFit/>
+          </a:bodyPr>
+          <a:lstStyle/>
+          <a:p>
+            <a:r>
+              <a:rPr lang="en-US" sz="2400" b="1" dirty="0" smtClean="0"/>
+              <a:t>3</a:t>
+            </a:r>
+            <a:endParaRPr lang="en-US" sz="2400" b="1" dirty="0"/>
+          </a:p>
+        </p:txBody>
+      </p:sp>
+    </p:spTree>
+    <p:extLst>
+      <p:ext uri="{BB962C8B-B14F-4D97-AF65-F5344CB8AC3E}">
+        <p14:creationId xmlns:p14="http://schemas.microsoft.com/office/powerpoint/2010/main" val="1962197636"/>
+      </p:ext>
+    </p:extLst>
+  </p:cSld>
+  <p:clrMapOvr>
+    <a:masterClrMapping/>
+  </p:clrMapOvr>
+  <p:timing>
+    <p:tnLst>
+      <p:par>
+        <p:cTn id="1" dur="indefinite" restart="never" nodeType="tmRoot"/>
+      </p:par>
+    </p:tnLst>
+  </p:timing>
+</p:sld>
+</file>
+
+<file path=ppt/slides/slide17.xml><?xml version="1.0" encoding="utf-8"?>
+<p:sld xmlns:a="http://schemas.openxmlformats.org/drawingml/2006/main" xmlns:r="http://schemas.openxmlformats.org/officeDocument/2006/relationships" xmlns:p="http://schemas.openxmlformats.org/presentationml/2006/main">
+  <p:cSld>
+    <p:spTree>
+      <p:nvGrpSpPr>
+        <p:cNvPr id="1" name=""/>
+        <p:cNvGrpSpPr/>
+        <p:nvPr/>
+      </p:nvGrpSpPr>
+      <p:grpSpPr>
+        <a:xfrm>
+          <a:off x="0" y="0"/>
+          <a:ext cx="0" cy="0"/>
+          <a:chOff x="0" y="0"/>
+          <a:chExt cx="0" cy="0"/>
+        </a:xfrm>
+      </p:grpSpPr>
+      <p:sp>
+        <p:nvSpPr>
+          <p:cNvPr id="2" name="Title 1"/>
+          <p:cNvSpPr>
+            <a:spLocks noGrp="1"/>
+          </p:cNvSpPr>
+          <p:nvPr>
+            <p:ph type="title"/>
+          </p:nvPr>
+        </p:nvSpPr>
+        <p:spPr>
+          <a:xfrm>
+            <a:off x="457200" y="274638"/>
+            <a:ext cx="8305800" cy="792162"/>
+          </a:xfrm>
+        </p:spPr>
+        <p:txBody>
+          <a:bodyPr>
+            <a:normAutofit/>
+          </a:bodyPr>
+          <a:lstStyle/>
+          <a:p>
+            <a:pPr algn="l"/>
+            <a:r>
+              <a:rPr lang="en-US" dirty="0" smtClean="0">
+                <a:solidFill>
+                  <a:schemeClr val="accent1">
+                    <a:lumMod val="75000"/>
+                  </a:schemeClr>
+                </a:solidFill>
+              </a:rPr>
               <a:t>Flattening</a:t>
             </a:r>
             <a:endParaRPr lang="en-US" dirty="0">

</xml_diff>